<commit_message>
AY: Final commit before presentation
</commit_message>
<xml_diff>
--- a/documentation/Hobby Project presentation.pptx
+++ b/documentation/Hobby Project presentation.pptx
@@ -5,7 +5,7 @@
     <p:sldMasterId id="2147483660" r:id="rId1"/>
   </p:sldMasterIdLst>
   <p:notesMasterIdLst>
-    <p:notesMasterId r:id="rId26"/>
+    <p:notesMasterId r:id="rId28"/>
   </p:notesMasterIdLst>
   <p:sldIdLst>
     <p:sldId id="256" r:id="rId2"/>
@@ -29,9 +29,11 @@
     <p:sldId id="312" r:id="rId20"/>
     <p:sldId id="308" r:id="rId21"/>
     <p:sldId id="293" r:id="rId22"/>
-    <p:sldId id="278" r:id="rId23"/>
-    <p:sldId id="301" r:id="rId24"/>
-    <p:sldId id="264" r:id="rId25"/>
+    <p:sldId id="313" r:id="rId23"/>
+    <p:sldId id="314" r:id="rId24"/>
+    <p:sldId id="278" r:id="rId25"/>
+    <p:sldId id="301" r:id="rId26"/>
+    <p:sldId id="264" r:id="rId27"/>
   </p:sldIdLst>
   <p:sldSz cx="12192000" cy="6858000"/>
   <p:notesSz cx="6858000" cy="9144000"/>
@@ -7518,6 +7520,365 @@
           <p:cNvPr id="2" name="Title 1">
             <a:extLst>
               <a:ext uri="{FF2B5EF4-FFF2-40B4-BE49-F238E27FC236}">
+                <a16:creationId xmlns:a16="http://schemas.microsoft.com/office/drawing/2014/main" id="{17DF7405-7712-47FD-B5D8-6385DB916825}"/>
+              </a:ext>
+            </a:extLst>
+          </p:cNvPr>
+          <p:cNvSpPr>
+            <a:spLocks noGrp="1"/>
+          </p:cNvSpPr>
+          <p:nvPr>
+            <p:ph type="title"/>
+          </p:nvPr>
+        </p:nvSpPr>
+        <p:spPr/>
+        <p:txBody>
+          <a:bodyPr/>
+          <a:lstStyle/>
+          <a:p>
+            <a:r>
+              <a:rPr lang="en-GB" dirty="0"/>
+              <a:t>Scope</a:t>
+            </a:r>
+          </a:p>
+        </p:txBody>
+      </p:sp>
+      <p:sp>
+        <p:nvSpPr>
+          <p:cNvPr id="3" name="Content Placeholder 2">
+            <a:extLst>
+              <a:ext uri="{FF2B5EF4-FFF2-40B4-BE49-F238E27FC236}">
+                <a16:creationId xmlns:a16="http://schemas.microsoft.com/office/drawing/2014/main" id="{EB5CA05E-3598-4C75-993A-C9FF53B2435F}"/>
+              </a:ext>
+            </a:extLst>
+          </p:cNvPr>
+          <p:cNvSpPr>
+            <a:spLocks noGrp="1"/>
+          </p:cNvSpPr>
+          <p:nvPr>
+            <p:ph idx="1"/>
+          </p:nvPr>
+        </p:nvSpPr>
+        <p:spPr/>
+        <p:txBody>
+          <a:bodyPr>
+            <a:normAutofit/>
+          </a:bodyPr>
+          <a:lstStyle/>
+          <a:p>
+            <a:pPr>
+              <a:buFont typeface="Wingdings" panose="05000000000000000000" pitchFamily="2" charset="2"/>
+              <a:buChar char="q"/>
+            </a:pPr>
+            <a:r>
+              <a:rPr lang="en-GB" sz="1700" dirty="0"/>
+              <a:t> A </a:t>
+            </a:r>
+            <a:r>
+              <a:rPr lang="en-GB" sz="1700" b="1" dirty="0"/>
+              <a:t>risk assessment </a:t>
+            </a:r>
+            <a:r>
+              <a:rPr lang="en-GB" sz="1700" dirty="0"/>
+              <a:t>which outlines the issues and risks faced during the project timeframe</a:t>
+            </a:r>
+          </a:p>
+          <a:p>
+            <a:pPr>
+              <a:buFont typeface="Wingdings" panose="05000000000000000000" pitchFamily="2" charset="2"/>
+              <a:buChar char="q"/>
+            </a:pPr>
+            <a:r>
+              <a:rPr lang="en-GB" sz="1700" dirty="0"/>
+              <a:t> Code fully integrated into a </a:t>
+            </a:r>
+            <a:r>
+              <a:rPr lang="en-GB" sz="1700" b="1" dirty="0"/>
+              <a:t>Version Control System</a:t>
+            </a:r>
+          </a:p>
+          <a:p>
+            <a:pPr>
+              <a:buFont typeface="Wingdings" panose="05000000000000000000" pitchFamily="2" charset="2"/>
+              <a:buChar char="q"/>
+            </a:pPr>
+            <a:r>
+              <a:rPr lang="en-GB" sz="1700" dirty="0"/>
+              <a:t> A </a:t>
+            </a:r>
+            <a:r>
+              <a:rPr lang="en-GB" sz="1700" b="1" dirty="0"/>
+              <a:t>project management board</a:t>
+            </a:r>
+          </a:p>
+          <a:p>
+            <a:pPr>
+              <a:buFont typeface="Wingdings" panose="05000000000000000000" pitchFamily="2" charset="2"/>
+              <a:buChar char="q"/>
+            </a:pPr>
+            <a:r>
+              <a:rPr lang="en-GB" sz="1700" dirty="0"/>
+              <a:t> A </a:t>
+            </a:r>
+            <a:r>
+              <a:rPr lang="en-GB" sz="1700" b="1" dirty="0"/>
+              <a:t>relational database </a:t>
+            </a:r>
+            <a:r>
+              <a:rPr lang="en-GB" sz="1700" dirty="0"/>
+              <a:t>used to persist data for the project</a:t>
+            </a:r>
+          </a:p>
+          <a:p>
+            <a:pPr>
+              <a:buFont typeface="Wingdings" panose="05000000000000000000" pitchFamily="2" charset="2"/>
+              <a:buChar char="q"/>
+            </a:pPr>
+            <a:r>
+              <a:rPr lang="en-GB" sz="1700" dirty="0"/>
+              <a:t> A functional application </a:t>
+            </a:r>
+            <a:r>
+              <a:rPr lang="en-GB" sz="1700" b="1" dirty="0"/>
+              <a:t>back-end</a:t>
+            </a:r>
+            <a:endParaRPr lang="en-GB" sz="1700" dirty="0"/>
+          </a:p>
+          <a:p>
+            <a:pPr>
+              <a:buFont typeface="Wingdings" panose="05000000000000000000" pitchFamily="2" charset="2"/>
+              <a:buChar char="q"/>
+            </a:pPr>
+            <a:r>
+              <a:rPr lang="en-GB" sz="1700" dirty="0"/>
+              <a:t> A functional </a:t>
+            </a:r>
+            <a:r>
+              <a:rPr lang="en-GB" sz="1700" b="1" dirty="0"/>
+              <a:t>‘front-end’</a:t>
+            </a:r>
+            <a:r>
+              <a:rPr lang="en-GB" sz="1700" dirty="0"/>
+              <a:t> website which connects to your back-end API.</a:t>
+            </a:r>
+          </a:p>
+          <a:p>
+            <a:pPr>
+              <a:buFont typeface="Wingdings" panose="05000000000000000000" pitchFamily="2" charset="2"/>
+              <a:buChar char="q"/>
+            </a:pPr>
+            <a:r>
+              <a:rPr lang="en-GB" sz="1700" dirty="0"/>
+              <a:t> A </a:t>
+            </a:r>
+            <a:r>
+              <a:rPr lang="en-GB" sz="1700" b="1" dirty="0"/>
+              <a:t>build</a:t>
+            </a:r>
+            <a:r>
+              <a:rPr lang="en-GB" sz="1700" dirty="0"/>
+              <a:t> of the application</a:t>
+            </a:r>
+          </a:p>
+          <a:p>
+            <a:pPr>
+              <a:buFont typeface="Wingdings" panose="05000000000000000000" pitchFamily="2" charset="2"/>
+              <a:buChar char="q"/>
+            </a:pPr>
+            <a:r>
+              <a:rPr lang="en-GB" sz="1700" b="1" dirty="0"/>
+              <a:t> </a:t>
+            </a:r>
+            <a:r>
+              <a:rPr lang="en-GB" sz="1700" b="1" dirty="0">
+                <a:highlight>
+                  <a:srgbClr val="FFFF00"/>
+                </a:highlight>
+              </a:rPr>
+              <a:t>Unit tests </a:t>
+            </a:r>
+            <a:r>
+              <a:rPr lang="en-GB" sz="1700" dirty="0">
+                <a:highlight>
+                  <a:srgbClr val="FFFF00"/>
+                </a:highlight>
+              </a:rPr>
+              <a:t>for validation of the application</a:t>
+            </a:r>
+          </a:p>
+          <a:p>
+            <a:endParaRPr lang="en-GB" dirty="0"/>
+          </a:p>
+        </p:txBody>
+      </p:sp>
+    </p:spTree>
+    <p:extLst>
+      <p:ext uri="{BB962C8B-B14F-4D97-AF65-F5344CB8AC3E}">
+        <p14:creationId xmlns:p14="http://schemas.microsoft.com/office/powerpoint/2010/main" val="1855454550"/>
+      </p:ext>
+    </p:extLst>
+  </p:cSld>
+  <p:clrMapOvr>
+    <a:masterClrMapping/>
+  </p:clrMapOvr>
+</p:sld>
+</file>
+
+<file path=ppt/slides/slide23.xml><?xml version="1.0" encoding="utf-8"?>
+<p:sld xmlns:a="http://schemas.openxmlformats.org/drawingml/2006/main" xmlns:r="http://schemas.openxmlformats.org/officeDocument/2006/relationships" xmlns:p="http://schemas.openxmlformats.org/presentationml/2006/main">
+  <p:cSld>
+    <p:spTree>
+      <p:nvGrpSpPr>
+        <p:cNvPr id="1" name=""/>
+        <p:cNvGrpSpPr/>
+        <p:nvPr/>
+      </p:nvGrpSpPr>
+      <p:grpSpPr>
+        <a:xfrm>
+          <a:off x="0" y="0"/>
+          <a:ext cx="0" cy="0"/>
+          <a:chOff x="0" y="0"/>
+          <a:chExt cx="0" cy="0"/>
+        </a:xfrm>
+      </p:grpSpPr>
+      <p:sp>
+        <p:nvSpPr>
+          <p:cNvPr id="9" name="Title 8">
+            <a:extLst>
+              <a:ext uri="{FF2B5EF4-FFF2-40B4-BE49-F238E27FC236}">
+                <a16:creationId xmlns:a16="http://schemas.microsoft.com/office/drawing/2014/main" id="{CF515865-7073-4ABC-9ADD-8760F766C6C4}"/>
+              </a:ext>
+            </a:extLst>
+          </p:cNvPr>
+          <p:cNvSpPr>
+            <a:spLocks noGrp="1"/>
+          </p:cNvSpPr>
+          <p:nvPr>
+            <p:ph type="title"/>
+          </p:nvPr>
+        </p:nvSpPr>
+        <p:spPr/>
+        <p:txBody>
+          <a:bodyPr/>
+          <a:lstStyle/>
+          <a:p>
+            <a:r>
+              <a:rPr lang="en-GB" dirty="0"/>
+              <a:t>Unit and Integration testing for Back-end</a:t>
+            </a:r>
+          </a:p>
+        </p:txBody>
+      </p:sp>
+      <p:pic>
+        <p:nvPicPr>
+          <p:cNvPr id="13" name="Content Placeholder 12">
+            <a:extLst>
+              <a:ext uri="{FF2B5EF4-FFF2-40B4-BE49-F238E27FC236}">
+                <a16:creationId xmlns:a16="http://schemas.microsoft.com/office/drawing/2014/main" id="{835EAADD-CAFB-4113-ACE3-A3C149D83A9E}"/>
+              </a:ext>
+            </a:extLst>
+          </p:cNvPr>
+          <p:cNvPicPr>
+            <a:picLocks noGrp="1" noChangeAspect="1"/>
+          </p:cNvPicPr>
+          <p:nvPr>
+            <p:ph sz="half" idx="1"/>
+          </p:nvPr>
+        </p:nvPicPr>
+        <p:blipFill>
+          <a:blip r:embed="rId2"/>
+          <a:stretch>
+            <a:fillRect/>
+          </a:stretch>
+        </p:blipFill>
+        <p:spPr>
+          <a:xfrm>
+            <a:off x="1158556" y="2201179"/>
+            <a:ext cx="4815526" cy="3312892"/>
+          </a:xfrm>
+        </p:spPr>
+      </p:pic>
+      <p:sp>
+        <p:nvSpPr>
+          <p:cNvPr id="11" name="Content Placeholder 10">
+            <a:extLst>
+              <a:ext uri="{FF2B5EF4-FFF2-40B4-BE49-F238E27FC236}">
+                <a16:creationId xmlns:a16="http://schemas.microsoft.com/office/drawing/2014/main" id="{3E042B6F-12DB-4E4B-BDEB-69F82C346DF4}"/>
+              </a:ext>
+            </a:extLst>
+          </p:cNvPr>
+          <p:cNvSpPr>
+            <a:spLocks noGrp="1"/>
+          </p:cNvSpPr>
+          <p:nvPr>
+            <p:ph sz="half" idx="2"/>
+          </p:nvPr>
+        </p:nvSpPr>
+        <p:spPr/>
+        <p:txBody>
+          <a:bodyPr/>
+          <a:lstStyle/>
+          <a:p>
+            <a:r>
+              <a:rPr lang="en-GB" dirty="0"/>
+              <a:t>Both Unit and Integration tests were performed.</a:t>
+            </a:r>
+          </a:p>
+          <a:p>
+            <a:r>
+              <a:rPr lang="en-GB" dirty="0"/>
+              <a:t>Overall test coverage of </a:t>
+            </a:r>
+            <a:r>
+              <a:rPr lang="en-GB" dirty="0">
+                <a:highlight>
+                  <a:srgbClr val="00FF00"/>
+                </a:highlight>
+              </a:rPr>
+              <a:t>84.5%</a:t>
+            </a:r>
+            <a:r>
+              <a:rPr lang="en-GB" dirty="0"/>
+              <a:t> was achieved</a:t>
+            </a:r>
+          </a:p>
+        </p:txBody>
+      </p:sp>
+    </p:spTree>
+    <p:extLst>
+      <p:ext uri="{BB962C8B-B14F-4D97-AF65-F5344CB8AC3E}">
+        <p14:creationId xmlns:p14="http://schemas.microsoft.com/office/powerpoint/2010/main" val="1035854717"/>
+      </p:ext>
+    </p:extLst>
+  </p:cSld>
+  <p:clrMapOvr>
+    <a:masterClrMapping/>
+  </p:clrMapOvr>
+</p:sld>
+</file>
+
+<file path=ppt/slides/slide24.xml><?xml version="1.0" encoding="utf-8"?>
+<p:sld xmlns:a="http://schemas.openxmlformats.org/drawingml/2006/main" xmlns:r="http://schemas.openxmlformats.org/officeDocument/2006/relationships" xmlns:p="http://schemas.openxmlformats.org/presentationml/2006/main">
+  <p:cSld>
+    <p:spTree>
+      <p:nvGrpSpPr>
+        <p:cNvPr id="1" name=""/>
+        <p:cNvGrpSpPr/>
+        <p:nvPr/>
+      </p:nvGrpSpPr>
+      <p:grpSpPr>
+        <a:xfrm>
+          <a:off x="0" y="0"/>
+          <a:ext cx="0" cy="0"/>
+          <a:chOff x="0" y="0"/>
+          <a:chExt cx="0" cy="0"/>
+        </a:xfrm>
+      </p:grpSpPr>
+      <p:sp>
+        <p:nvSpPr>
+          <p:cNvPr id="2" name="Title 1">
+            <a:extLst>
+              <a:ext uri="{FF2B5EF4-FFF2-40B4-BE49-F238E27FC236}">
                 <a16:creationId xmlns:a16="http://schemas.microsoft.com/office/drawing/2014/main" id="{3E6B4067-F3A5-4405-A55D-A43F49B7C911}"/>
               </a:ext>
             </a:extLst>
@@ -7626,7 +7987,7 @@
 </p:sld>
 </file>
 
-<file path=ppt/slides/slide23.xml><?xml version="1.0" encoding="utf-8"?>
+<file path=ppt/slides/slide25.xml><?xml version="1.0" encoding="utf-8"?>
 <p:sld xmlns:a="http://schemas.openxmlformats.org/drawingml/2006/main" xmlns:r="http://schemas.openxmlformats.org/officeDocument/2006/relationships" xmlns:p="http://schemas.openxmlformats.org/presentationml/2006/main">
   <p:cSld>
     <p:spTree>
@@ -7757,7 +8118,7 @@
 </p:sld>
 </file>
 
-<file path=ppt/slides/slide24.xml><?xml version="1.0" encoding="utf-8"?>
+<file path=ppt/slides/slide26.xml><?xml version="1.0" encoding="utf-8"?>
 <p:sld xmlns:a="http://schemas.openxmlformats.org/drawingml/2006/main" xmlns:r="http://schemas.openxmlformats.org/officeDocument/2006/relationships" xmlns:p="http://schemas.openxmlformats.org/presentationml/2006/main">
   <p:cSld>
     <p:spTree>

</xml_diff>

<commit_message>
AY: typos fixed in ppt pres slides
</commit_message>
<xml_diff>
--- a/documentation/Hobby Project presentation.pptx
+++ b/documentation/Hobby Project presentation.pptx
@@ -9396,16 +9396,29 @@
           <a:bodyPr/>
           <a:lstStyle/>
           <a:p>
-            <a:endParaRPr lang="en-GB" dirty="0"/>
+            <a:r>
+              <a:rPr lang="en-GB" dirty="0"/>
+              <a:t>Insufficient time had the highest associated risk</a:t>
+            </a:r>
+          </a:p>
+          <a:p>
+            <a:pPr marL="285750" indent="-285750">
+              <a:buFont typeface="Arial" panose="020B0604020202020204" pitchFamily="34" charset="0"/>
+              <a:buChar char="•"/>
+            </a:pPr>
+            <a:r>
+              <a:rPr lang="en-GB" dirty="0"/>
+              <a:t>Ultimately, there was insufficient time to complete Selenium testing of the front-end</a:t>
+            </a:r>
           </a:p>
         </p:txBody>
       </p:sp>
       <p:pic>
         <p:nvPicPr>
-          <p:cNvPr id="9" name="Content Placeholder 9">
+          <p:cNvPr id="8" name="Content Placeholder 7">
             <a:extLst>
               <a:ext uri="{FF2B5EF4-FFF2-40B4-BE49-F238E27FC236}">
-                <a16:creationId xmlns:a16="http://schemas.microsoft.com/office/drawing/2014/main" id="{EB86BA46-C314-450A-AF9B-F6E7BA58F8E5}"/>
+                <a16:creationId xmlns:a16="http://schemas.microsoft.com/office/drawing/2014/main" id="{4256D8CB-D085-44A4-B763-D1ED93BF2135}"/>
               </a:ext>
             </a:extLst>
           </p:cNvPr>
@@ -9424,22 +9437,9 @@
         </p:blipFill>
         <p:spPr>
           <a:xfrm>
-            <a:off x="5619968" y="731838"/>
-            <a:ext cx="4854139" cy="5257800"/>
+            <a:off x="4901310" y="731838"/>
+            <a:ext cx="6291454" cy="5257800"/>
           </a:xfrm>
-          <a:prstGeom prst="rect">
-            <a:avLst/>
-          </a:prstGeom>
-          <a:ln>
-            <a:noFill/>
-          </a:ln>
-          <a:effectLst>
-            <a:outerShdw blurRad="292100" dist="139700" dir="2700000" algn="tl" rotWithShape="0">
-              <a:srgbClr val="333333">
-                <a:alpha val="65000"/>
-              </a:srgbClr>
-            </a:outerShdw>
-          </a:effectLst>
         </p:spPr>
       </p:pic>
     </p:spTree>

</xml_diff>